<commit_message>
Opdateret kode og powerpoint
</commit_message>
<xml_diff>
--- a/Eksamensnoter/Powerpoint.pptx
+++ b/Eksamensnoter/Powerpoint.pptx
@@ -8,10 +8,12 @@
     <p:sldId id="256" r:id="rId2"/>
     <p:sldId id="257" r:id="rId3"/>
     <p:sldId id="258" r:id="rId4"/>
-    <p:sldId id="259" r:id="rId5"/>
-    <p:sldId id="260" r:id="rId6"/>
-    <p:sldId id="262" r:id="rId7"/>
-    <p:sldId id="261" r:id="rId8"/>
+    <p:sldId id="263" r:id="rId5"/>
+    <p:sldId id="259" r:id="rId6"/>
+    <p:sldId id="260" r:id="rId7"/>
+    <p:sldId id="262" r:id="rId8"/>
+    <p:sldId id="261" r:id="rId9"/>
+    <p:sldId id="264" r:id="rId10"/>
   </p:sldIdLst>
   <p:sldSz cx="12192000" cy="6858000"/>
   <p:notesSz cx="6858000" cy="9144000"/>
@@ -110,6 +112,11 @@
       </a:defRPr>
     </a:lvl9pPr>
   </p:defaultTextStyle>
+  <p:extLst>
+    <p:ext uri="{EFAFB233-063F-42B5-8137-9DF3F51BA10A}">
+      <p15:sldGuideLst xmlns:p15="http://schemas.microsoft.com/office/powerpoint/2012/main"/>
+    </p:ext>
+  </p:extLst>
 </p:presentation>
 </file>
 
@@ -3343,9 +3350,16 @@
             <p:ph type="ctrTitle"/>
           </p:nvPr>
         </p:nvSpPr>
-        <p:spPr/>
-        <p:txBody>
-          <a:bodyPr/>
+        <p:spPr>
+          <a:xfrm>
+            <a:off x="1524000" y="0"/>
+            <a:ext cx="9144000" cy="1125415"/>
+          </a:xfrm>
+        </p:spPr>
+        <p:txBody>
+          <a:bodyPr>
+            <a:normAutofit/>
+          </a:bodyPr>
           <a:lstStyle/>
           <a:p>
             <a:r>
@@ -3379,15 +3393,162 @@
             <p:ph type="subTitle" idx="1"/>
           </p:nvPr>
         </p:nvSpPr>
-        <p:spPr/>
-        <p:txBody>
-          <a:bodyPr/>
-          <a:lstStyle/>
-          <a:p>
-            <a:r>
-              <a:rPr lang="en-US" dirty="0"/>
-              <a:t>Joachim, Frederik, Anders</a:t>
-            </a:r>
+        <p:spPr>
+          <a:xfrm>
+            <a:off x="1524000" y="1230923"/>
+            <a:ext cx="9144000" cy="4976446"/>
+          </a:xfrm>
+        </p:spPr>
+        <p:txBody>
+          <a:bodyPr>
+            <a:normAutofit/>
+          </a:bodyPr>
+          <a:lstStyle/>
+          <a:p>
+            <a:pPr algn="l"/>
+            <a:r>
+              <a:rPr lang="en-US" sz="3200" dirty="0" err="1"/>
+              <a:t>Introduktion</a:t>
+            </a:r>
+            <a:endParaRPr lang="en-US" sz="3200" dirty="0"/>
+          </a:p>
+          <a:p>
+            <a:pPr algn="l"/>
+            <a:r>
+              <a:rPr lang="en-US" sz="3200" dirty="0" err="1"/>
+              <a:t>Præsentation</a:t>
+            </a:r>
+            <a:r>
+              <a:rPr lang="en-US" sz="3200" dirty="0"/>
+              <a:t> </a:t>
+            </a:r>
+            <a:r>
+              <a:rPr lang="en-US" sz="3200" dirty="0" err="1"/>
+              <a:t>af</a:t>
+            </a:r>
+            <a:r>
+              <a:rPr lang="en-US" sz="3200" dirty="0"/>
+              <a:t> system</a:t>
+            </a:r>
+          </a:p>
+          <a:p>
+            <a:pPr algn="l"/>
+            <a:r>
+              <a:rPr lang="en-US" sz="3200" dirty="0"/>
+              <a:t>	</a:t>
+            </a:r>
+            <a:r>
+              <a:rPr lang="en-US" sz="3200" dirty="0" err="1"/>
+              <a:t>Hvad</a:t>
+            </a:r>
+            <a:r>
+              <a:rPr lang="en-US" sz="3200" dirty="0"/>
+              <a:t> </a:t>
+            </a:r>
+            <a:r>
+              <a:rPr lang="en-US" sz="3200" dirty="0" err="1"/>
+              <a:t>kan</a:t>
+            </a:r>
+            <a:r>
+              <a:rPr lang="en-US" sz="3200" dirty="0"/>
+              <a:t> </a:t>
+            </a:r>
+            <a:r>
+              <a:rPr lang="en-US" sz="3200" dirty="0" err="1"/>
+              <a:t>systemet</a:t>
+            </a:r>
+            <a:r>
+              <a:rPr lang="en-US" sz="3200" dirty="0"/>
+              <a:t>?</a:t>
+            </a:r>
+          </a:p>
+          <a:p>
+            <a:pPr algn="l"/>
+            <a:r>
+              <a:rPr lang="en-US" sz="3200" dirty="0"/>
+              <a:t>	</a:t>
+            </a:r>
+            <a:r>
+              <a:rPr lang="en-US" sz="3200" dirty="0" err="1"/>
+              <a:t>Arkitektur</a:t>
+            </a:r>
+            <a:r>
+              <a:rPr lang="en-US" sz="3200" dirty="0"/>
+              <a:t> – MVVM</a:t>
+            </a:r>
+            <a:br>
+              <a:rPr lang="en-US" sz="3200" dirty="0"/>
+            </a:br>
+            <a:r>
+              <a:rPr lang="en-US" sz="3200" dirty="0"/>
+              <a:t>	</a:t>
+            </a:r>
+            <a:r>
+              <a:rPr lang="en-US" sz="3200" dirty="0" err="1"/>
+              <a:t>Arkitektur</a:t>
+            </a:r>
+            <a:r>
+              <a:rPr lang="en-US" sz="3200" dirty="0"/>
+              <a:t> – REST / DB</a:t>
+            </a:r>
+          </a:p>
+          <a:p>
+            <a:pPr algn="l"/>
+            <a:r>
+              <a:rPr lang="en-US" sz="3200" dirty="0" err="1"/>
+              <a:t>Emne</a:t>
+            </a:r>
+            <a:r>
+              <a:rPr lang="en-US" sz="3200" dirty="0"/>
+              <a:t> #1 – </a:t>
+            </a:r>
+            <a:r>
+              <a:rPr lang="en-US" sz="3200" dirty="0" err="1"/>
+              <a:t>Bruger</a:t>
+            </a:r>
+            <a:endParaRPr lang="en-US" sz="3200" dirty="0"/>
+          </a:p>
+          <a:p>
+            <a:pPr algn="l"/>
+            <a:r>
+              <a:rPr lang="en-US" sz="3200" dirty="0" err="1"/>
+              <a:t>Emne</a:t>
+            </a:r>
+            <a:r>
+              <a:rPr lang="en-US" sz="3200" dirty="0"/>
+              <a:t> #2 – GUI design</a:t>
+            </a:r>
+          </a:p>
+          <a:p>
+            <a:pPr algn="l"/>
+            <a:r>
+              <a:rPr lang="en-US" sz="3200" dirty="0" err="1"/>
+              <a:t>Emne</a:t>
+            </a:r>
+            <a:r>
+              <a:rPr lang="en-US" sz="3200" dirty="0"/>
+              <a:t> #3 – Test</a:t>
+            </a:r>
+          </a:p>
+          <a:p>
+            <a:pPr algn="l"/>
+            <a:r>
+              <a:rPr lang="en-US" sz="3200" dirty="0"/>
+              <a:t>Tanker </a:t>
+            </a:r>
+            <a:r>
+              <a:rPr lang="en-US" sz="3200" dirty="0" err="1"/>
+              <a:t>til</a:t>
+            </a:r>
+            <a:r>
+              <a:rPr lang="en-US" sz="3200" dirty="0"/>
+              <a:t> </a:t>
+            </a:r>
+            <a:r>
+              <a:rPr lang="en-US" sz="3200" dirty="0" err="1"/>
+              <a:t>fremtiden</a:t>
+            </a:r>
+            <a:endParaRPr lang="en-US" sz="3200" dirty="0"/>
           </a:p>
         </p:txBody>
       </p:sp>
@@ -3443,10 +3604,9 @@
           <a:lstStyle/>
           <a:p>
             <a:r>
-              <a:rPr lang="en-US" dirty="0" err="1"/>
-              <a:t>Projekt</a:t>
-            </a:r>
-            <a:endParaRPr lang="en-US" dirty="0"/>
+              <a:rPr lang="en-US" dirty="0"/>
+              <a:t>Intro</a:t>
+            </a:r>
           </a:p>
         </p:txBody>
       </p:sp>
@@ -3472,38 +3632,73 @@
           <a:lstStyle/>
           <a:p>
             <a:r>
-              <a:rPr lang="en-US" dirty="0"/>
+              <a:rPr lang="en-US" sz="4000" dirty="0"/>
               <a:t>Aarhus </a:t>
             </a:r>
             <a:r>
-              <a:rPr lang="en-US" dirty="0" err="1"/>
+              <a:rPr lang="en-US" sz="4000" dirty="0" err="1"/>
               <a:t>Universitet</a:t>
             </a:r>
             <a:r>
-              <a:rPr lang="en-US" dirty="0"/>
+              <a:rPr lang="en-US" sz="4000" dirty="0"/>
               <a:t>, </a:t>
             </a:r>
             <a:r>
-              <a:rPr lang="en-US" dirty="0" err="1"/>
+              <a:rPr lang="en-US" sz="4000" dirty="0" err="1"/>
               <a:t>Miljøvidenskab</a:t>
             </a:r>
             <a:r>
-              <a:rPr lang="en-US" dirty="0"/>
+              <a:rPr lang="en-US" sz="4000" dirty="0"/>
               <a:t> </a:t>
             </a:r>
             <a:r>
-              <a:rPr lang="en-US" dirty="0" err="1"/>
+              <a:rPr lang="en-US" sz="4000" dirty="0" err="1"/>
               <a:t>i</a:t>
             </a:r>
             <a:r>
-              <a:rPr lang="en-US" dirty="0"/>
+              <a:rPr lang="en-US" sz="4000" dirty="0"/>
               <a:t> </a:t>
             </a:r>
             <a:r>
-              <a:rPr lang="en-US" dirty="0" err="1"/>
+              <a:rPr lang="en-US" sz="4000" dirty="0" err="1"/>
               <a:t>Risø</a:t>
             </a:r>
-            <a:endParaRPr lang="en-US" dirty="0"/>
+            <a:endParaRPr lang="en-US" sz="4000" dirty="0"/>
+          </a:p>
+          <a:p>
+            <a:r>
+              <a:rPr lang="en-US" sz="4000" dirty="0"/>
+              <a:t>8 </a:t>
+            </a:r>
+            <a:r>
+              <a:rPr lang="en-US" sz="4000" dirty="0" err="1"/>
+              <a:t>ugers</a:t>
+            </a:r>
+            <a:r>
+              <a:rPr lang="en-US" sz="4000" dirty="0"/>
+              <a:t> </a:t>
+            </a:r>
+            <a:r>
+              <a:rPr lang="en-US" sz="4000" dirty="0" err="1"/>
+              <a:t>arbejde</a:t>
+            </a:r>
+            <a:endParaRPr lang="en-US" sz="4000" dirty="0"/>
+          </a:p>
+          <a:p>
+            <a:r>
+              <a:rPr lang="en-US" sz="4000" dirty="0"/>
+              <a:t>Keld Mortensen</a:t>
+            </a:r>
+          </a:p>
+          <a:p>
+            <a:r>
+              <a:rPr lang="en-US" sz="4000" dirty="0" err="1"/>
+              <a:t>Målestationer</a:t>
+            </a:r>
+            <a:r>
+              <a:rPr lang="en-US" sz="4000" dirty="0"/>
+              <a:t> - Analog</a:t>
+            </a:r>
           </a:p>
           <a:p>
             <a:endParaRPr lang="en-US" dirty="0"/>
@@ -3605,72 +3800,45 @@
           <a:chExt cx="0" cy="0"/>
         </a:xfrm>
       </p:grpSpPr>
-      <p:sp>
-        <p:nvSpPr>
-          <p:cNvPr id="2" name="Title 1">
-            <a:extLst>
-              <a:ext uri="{FF2B5EF4-FFF2-40B4-BE49-F238E27FC236}">
-                <a16:creationId xmlns:a16="http://schemas.microsoft.com/office/drawing/2014/main" id="{EECE62E4-737B-49A5-BDDC-3210977CEA57}"/>
-              </a:ext>
-            </a:extLst>
-          </p:cNvPr>
-          <p:cNvSpPr>
-            <a:spLocks noGrp="1"/>
-          </p:cNvSpPr>
-          <p:nvPr>
-            <p:ph type="title"/>
-          </p:nvPr>
-        </p:nvSpPr>
-        <p:spPr/>
-        <p:txBody>
-          <a:bodyPr/>
-          <a:lstStyle/>
-          <a:p>
-            <a:r>
-              <a:rPr lang="en-US" dirty="0" err="1"/>
-              <a:t>Emne</a:t>
-            </a:r>
-            <a:r>
-              <a:rPr lang="en-US" dirty="0"/>
-              <a:t> – </a:t>
-            </a:r>
-            <a:r>
-              <a:rPr lang="en-US" dirty="0" err="1"/>
-              <a:t>Bruger</a:t>
-            </a:r>
-            <a:endParaRPr lang="en-US" dirty="0"/>
-          </a:p>
-        </p:txBody>
-      </p:sp>
-      <p:sp>
-        <p:nvSpPr>
-          <p:cNvPr id="3" name="Content Placeholder 2">
-            <a:extLst>
-              <a:ext uri="{FF2B5EF4-FFF2-40B4-BE49-F238E27FC236}">
-                <a16:creationId xmlns:a16="http://schemas.microsoft.com/office/drawing/2014/main" id="{F2D79EB3-2DCE-4116-94CF-47324E96007B}"/>
-              </a:ext>
-            </a:extLst>
-          </p:cNvPr>
-          <p:cNvSpPr>
-            <a:spLocks noGrp="1"/>
-          </p:cNvSpPr>
+      <p:pic>
+        <p:nvPicPr>
+          <p:cNvPr id="5" name="Content Placeholder 4">
+            <a:extLst>
+              <a:ext uri="{FF2B5EF4-FFF2-40B4-BE49-F238E27FC236}">
+                <a16:creationId xmlns:a16="http://schemas.microsoft.com/office/drawing/2014/main" id="{948746B3-B790-4D13-893A-AEA73AF130CF}"/>
+              </a:ext>
+            </a:extLst>
+          </p:cNvPr>
+          <p:cNvPicPr>
+            <a:picLocks noGrp="1" noChangeAspect="1"/>
+          </p:cNvPicPr>
           <p:nvPr>
             <p:ph idx="1"/>
           </p:nvPr>
-        </p:nvSpPr>
-        <p:spPr/>
-        <p:txBody>
-          <a:bodyPr/>
-          <a:lstStyle/>
-          <a:p>
-            <a:endParaRPr lang="en-US" dirty="0"/>
-          </a:p>
-        </p:txBody>
-      </p:sp>
+        </p:nvPicPr>
+        <p:blipFill>
+          <a:blip r:embed="rId2">
+            <a:extLst>
+              <a:ext uri="{28A0092B-C50C-407E-A947-70E740481C1C}">
+                <a14:useLocalDpi xmlns:a14="http://schemas.microsoft.com/office/drawing/2010/main" val="0"/>
+              </a:ext>
+            </a:extLst>
+          </a:blip>
+          <a:stretch>
+            <a:fillRect/>
+          </a:stretch>
+        </p:blipFill>
+        <p:spPr>
+          <a:xfrm>
+            <a:off x="1811055" y="365125"/>
+            <a:ext cx="8569889" cy="5362099"/>
+          </a:xfrm>
+        </p:spPr>
+      </p:pic>
     </p:spTree>
     <p:extLst>
       <p:ext uri="{BB962C8B-B14F-4D97-AF65-F5344CB8AC3E}">
-        <p14:creationId xmlns:p14="http://schemas.microsoft.com/office/powerpoint/2010/main" val="4256997610"/>
+        <p14:creationId xmlns:p14="http://schemas.microsoft.com/office/powerpoint/2010/main" val="124769893"/>
       </p:ext>
     </p:extLst>
   </p:cSld>
@@ -3702,7 +3870,7 @@
           <p:cNvPr id="2" name="Title 1">
             <a:extLst>
               <a:ext uri="{FF2B5EF4-FFF2-40B4-BE49-F238E27FC236}">
-                <a16:creationId xmlns:a16="http://schemas.microsoft.com/office/drawing/2014/main" id="{84A96842-4C10-41EF-85B8-3A8B9B5B32FC}"/>
+                <a16:creationId xmlns:a16="http://schemas.microsoft.com/office/drawing/2014/main" id="{EECE62E4-737B-49A5-BDDC-3210977CEA57}"/>
               </a:ext>
             </a:extLst>
           </p:cNvPr>
@@ -3724,11 +3892,11 @@
             </a:r>
             <a:r>
               <a:rPr lang="en-US" dirty="0"/>
-              <a:t> – GUI / </a:t>
+              <a:t> – </a:t>
             </a:r>
             <a:r>
               <a:rPr lang="en-US" dirty="0" err="1"/>
-              <a:t>Heuristikker</a:t>
+              <a:t>Bruger</a:t>
             </a:r>
             <a:endParaRPr lang="en-US" dirty="0"/>
           </a:p>
@@ -3739,7 +3907,7 @@
           <p:cNvPr id="3" name="Content Placeholder 2">
             <a:extLst>
               <a:ext uri="{FF2B5EF4-FFF2-40B4-BE49-F238E27FC236}">
-                <a16:creationId xmlns:a16="http://schemas.microsoft.com/office/drawing/2014/main" id="{1C555A5A-0648-49D7-8E1D-2F8CA7AF80E7}"/>
+                <a16:creationId xmlns:a16="http://schemas.microsoft.com/office/drawing/2014/main" id="{F2D79EB3-2DCE-4116-94CF-47324E96007B}"/>
               </a:ext>
             </a:extLst>
           </p:cNvPr>
@@ -3752,62 +3920,17 @@
         </p:nvSpPr>
         <p:spPr/>
         <p:txBody>
-          <a:bodyPr>
-            <a:normAutofit/>
-          </a:bodyPr>
-          <a:lstStyle/>
-          <a:p>
-            <a:r>
-              <a:rPr lang="en-US" sz="3200" dirty="0" err="1"/>
-              <a:t>Tidlige</a:t>
-            </a:r>
-            <a:r>
-              <a:rPr lang="en-US" sz="3200" dirty="0"/>
-              <a:t> tanker:</a:t>
-            </a:r>
-          </a:p>
-          <a:p>
-            <a:pPr lvl="1"/>
-            <a:r>
-              <a:rPr lang="en-US" sz="3200" dirty="0"/>
-              <a:t>2. Match between system and the real world</a:t>
-            </a:r>
-          </a:p>
-          <a:p>
-            <a:pPr lvl="2"/>
-            <a:r>
-              <a:rPr lang="en-US" sz="3200" dirty="0"/>
-              <a:t>Sprog</a:t>
-            </a:r>
-          </a:p>
-          <a:p>
-            <a:pPr lvl="2"/>
-            <a:endParaRPr lang="en-US" sz="3200" dirty="0"/>
-          </a:p>
-          <a:p>
-            <a:pPr lvl="1"/>
-            <a:r>
-              <a:rPr lang="en-US" sz="3200" dirty="0"/>
-              <a:t>5. Error prevention</a:t>
-            </a:r>
-          </a:p>
-          <a:p>
-            <a:pPr lvl="2"/>
-            <a:r>
-              <a:rPr lang="en-US" sz="3200" dirty="0" err="1"/>
-              <a:t>Knapper</a:t>
-            </a:r>
-            <a:r>
-              <a:rPr lang="en-US" sz="3200" dirty="0"/>
-              <a:t> / dropdown</a:t>
-            </a:r>
+          <a:bodyPr/>
+          <a:lstStyle/>
+          <a:p>
+            <a:endParaRPr lang="en-US" dirty="0"/>
           </a:p>
         </p:txBody>
       </p:sp>
     </p:spTree>
     <p:extLst>
       <p:ext uri="{BB962C8B-B14F-4D97-AF65-F5344CB8AC3E}">
-        <p14:creationId xmlns:p14="http://schemas.microsoft.com/office/powerpoint/2010/main" val="669707478"/>
+        <p14:creationId xmlns:p14="http://schemas.microsoft.com/office/powerpoint/2010/main" val="4256997610"/>
       </p:ext>
     </p:extLst>
   </p:cSld>
@@ -3896,7 +4019,7 @@
           <a:p>
             <a:r>
               <a:rPr lang="en-US" sz="3200" dirty="0" err="1"/>
-              <a:t>Senere</a:t>
+              <a:t>Tidlige</a:t>
             </a:r>
             <a:r>
               <a:rPr lang="en-US" sz="3200" dirty="0"/>
@@ -3907,14 +4030,14 @@
             <a:pPr lvl="1"/>
             <a:r>
               <a:rPr lang="en-US" sz="3200" dirty="0"/>
-              <a:t>6. Recognition rather than recall</a:t>
+              <a:t>2. Match between system and the real world</a:t>
             </a:r>
           </a:p>
           <a:p>
             <a:pPr lvl="2"/>
             <a:r>
               <a:rPr lang="en-US" sz="3200" dirty="0"/>
-              <a:t>Tooltips / Help ikon</a:t>
+              <a:t>Sprog</a:t>
             </a:r>
           </a:p>
           <a:p>
@@ -3925,26 +4048,18 @@
             <a:pPr lvl="1"/>
             <a:r>
               <a:rPr lang="en-US" sz="3200" dirty="0"/>
-              <a:t>9. Help users recognize, diagnose, and recover from errors</a:t>
+              <a:t>5. Error prevention</a:t>
             </a:r>
           </a:p>
           <a:p>
             <a:pPr lvl="2"/>
             <a:r>
               <a:rPr lang="en-US" sz="3200" dirty="0" err="1"/>
-              <a:t>Fejlbeskeder</a:t>
+              <a:t>Knapper</a:t>
             </a:r>
             <a:r>
               <a:rPr lang="en-US" sz="3200" dirty="0"/>
-              <a:t> (</a:t>
-            </a:r>
-            <a:r>
-              <a:rPr lang="en-US" sz="3200" dirty="0" err="1"/>
-              <a:t>MessageDialogHandler</a:t>
-            </a:r>
-            <a:r>
-              <a:rPr lang="en-US" sz="3200" dirty="0"/>
-              <a:t>)</a:t>
+              <a:t> / dropdown</a:t>
             </a:r>
           </a:p>
         </p:txBody>
@@ -3952,7 +4067,7 @@
     </p:spTree>
     <p:extLst>
       <p:ext uri="{BB962C8B-B14F-4D97-AF65-F5344CB8AC3E}">
-        <p14:creationId xmlns:p14="http://schemas.microsoft.com/office/powerpoint/2010/main" val="3251790607"/>
+        <p14:creationId xmlns:p14="http://schemas.microsoft.com/office/powerpoint/2010/main" val="669707478"/>
       </p:ext>
     </p:extLst>
   </p:cSld>
@@ -3984,7 +4099,7 @@
           <p:cNvPr id="2" name="Title 1">
             <a:extLst>
               <a:ext uri="{FF2B5EF4-FFF2-40B4-BE49-F238E27FC236}">
-                <a16:creationId xmlns:a16="http://schemas.microsoft.com/office/drawing/2014/main" id="{7CE6B36F-29C4-4BB5-A220-F730123DA941}"/>
+                <a16:creationId xmlns:a16="http://schemas.microsoft.com/office/drawing/2014/main" id="{84A96842-4C10-41EF-85B8-3A8B9B5B32FC}"/>
               </a:ext>
             </a:extLst>
           </p:cNvPr>
@@ -4006,6 +4121,151 @@
             </a:r>
             <a:r>
               <a:rPr lang="en-US" dirty="0"/>
+              <a:t> – GUI / </a:t>
+            </a:r>
+            <a:r>
+              <a:rPr lang="en-US" dirty="0" err="1"/>
+              <a:t>Heuristikker</a:t>
+            </a:r>
+            <a:endParaRPr lang="en-US" dirty="0"/>
+          </a:p>
+        </p:txBody>
+      </p:sp>
+      <p:sp>
+        <p:nvSpPr>
+          <p:cNvPr id="3" name="Content Placeholder 2">
+            <a:extLst>
+              <a:ext uri="{FF2B5EF4-FFF2-40B4-BE49-F238E27FC236}">
+                <a16:creationId xmlns:a16="http://schemas.microsoft.com/office/drawing/2014/main" id="{1C555A5A-0648-49D7-8E1D-2F8CA7AF80E7}"/>
+              </a:ext>
+            </a:extLst>
+          </p:cNvPr>
+          <p:cNvSpPr>
+            <a:spLocks noGrp="1"/>
+          </p:cNvSpPr>
+          <p:nvPr>
+            <p:ph idx="1"/>
+          </p:nvPr>
+        </p:nvSpPr>
+        <p:spPr/>
+        <p:txBody>
+          <a:bodyPr>
+            <a:normAutofit/>
+          </a:bodyPr>
+          <a:lstStyle/>
+          <a:p>
+            <a:r>
+              <a:rPr lang="en-US" sz="3200" dirty="0" err="1"/>
+              <a:t>Senere</a:t>
+            </a:r>
+            <a:r>
+              <a:rPr lang="en-US" sz="3200" dirty="0"/>
+              <a:t> tanker:</a:t>
+            </a:r>
+          </a:p>
+          <a:p>
+            <a:pPr lvl="1"/>
+            <a:r>
+              <a:rPr lang="en-US" sz="3200" dirty="0"/>
+              <a:t>6. Recognition rather than recall</a:t>
+            </a:r>
+          </a:p>
+          <a:p>
+            <a:pPr lvl="2"/>
+            <a:r>
+              <a:rPr lang="en-US" sz="3200" dirty="0"/>
+              <a:t>Tooltips / Help ikon</a:t>
+            </a:r>
+          </a:p>
+          <a:p>
+            <a:pPr lvl="2"/>
+            <a:endParaRPr lang="en-US" sz="3200" dirty="0"/>
+          </a:p>
+          <a:p>
+            <a:pPr lvl="1"/>
+            <a:r>
+              <a:rPr lang="en-US" sz="3200" dirty="0"/>
+              <a:t>9. Help users recognize, diagnose, and recover from errors</a:t>
+            </a:r>
+          </a:p>
+          <a:p>
+            <a:pPr lvl="2"/>
+            <a:r>
+              <a:rPr lang="en-US" sz="3200" dirty="0" err="1"/>
+              <a:t>Fejlbeskeder</a:t>
+            </a:r>
+            <a:r>
+              <a:rPr lang="en-US" sz="3200" dirty="0"/>
+              <a:t> (</a:t>
+            </a:r>
+            <a:r>
+              <a:rPr lang="en-US" sz="3200" dirty="0" err="1"/>
+              <a:t>MessageDialogHandler</a:t>
+            </a:r>
+            <a:r>
+              <a:rPr lang="en-US" sz="3200" dirty="0"/>
+              <a:t>)</a:t>
+            </a:r>
+          </a:p>
+        </p:txBody>
+      </p:sp>
+    </p:spTree>
+    <p:extLst>
+      <p:ext uri="{BB962C8B-B14F-4D97-AF65-F5344CB8AC3E}">
+        <p14:creationId xmlns:p14="http://schemas.microsoft.com/office/powerpoint/2010/main" val="3251790607"/>
+      </p:ext>
+    </p:extLst>
+  </p:cSld>
+  <p:clrMapOvr>
+    <a:masterClrMapping/>
+  </p:clrMapOvr>
+</p:sld>
+</file>
+
+<file path=ppt/slides/slide8.xml><?xml version="1.0" encoding="utf-8"?>
+<p:sld xmlns:a="http://schemas.openxmlformats.org/drawingml/2006/main" xmlns:r="http://schemas.openxmlformats.org/officeDocument/2006/relationships" xmlns:p="http://schemas.openxmlformats.org/presentationml/2006/main">
+  <p:cSld>
+    <p:spTree>
+      <p:nvGrpSpPr>
+        <p:cNvPr id="1" name=""/>
+        <p:cNvGrpSpPr/>
+        <p:nvPr/>
+      </p:nvGrpSpPr>
+      <p:grpSpPr>
+        <a:xfrm>
+          <a:off x="0" y="0"/>
+          <a:ext cx="0" cy="0"/>
+          <a:chOff x="0" y="0"/>
+          <a:chExt cx="0" cy="0"/>
+        </a:xfrm>
+      </p:grpSpPr>
+      <p:sp>
+        <p:nvSpPr>
+          <p:cNvPr id="2" name="Title 1">
+            <a:extLst>
+              <a:ext uri="{FF2B5EF4-FFF2-40B4-BE49-F238E27FC236}">
+                <a16:creationId xmlns:a16="http://schemas.microsoft.com/office/drawing/2014/main" id="{7CE6B36F-29C4-4BB5-A220-F730123DA941}"/>
+              </a:ext>
+            </a:extLst>
+          </p:cNvPr>
+          <p:cNvSpPr>
+            <a:spLocks noGrp="1"/>
+          </p:cNvSpPr>
+          <p:nvPr>
+            <p:ph type="title"/>
+          </p:nvPr>
+        </p:nvSpPr>
+        <p:spPr/>
+        <p:txBody>
+          <a:bodyPr/>
+          <a:lstStyle/>
+          <a:p>
+            <a:r>
+              <a:rPr lang="en-US" dirty="0" err="1"/>
+              <a:t>Emne</a:t>
+            </a:r>
+            <a:r>
+              <a:rPr lang="en-US" dirty="0"/>
               <a:t> – Test</a:t>
             </a:r>
           </a:p>
@@ -4029,10 +4289,70 @@
         </p:nvSpPr>
         <p:spPr/>
         <p:txBody>
-          <a:bodyPr/>
-          <a:lstStyle/>
-          <a:p>
-            <a:endParaRPr lang="en-US"/>
+          <a:bodyPr>
+            <a:normAutofit/>
+          </a:bodyPr>
+          <a:lstStyle/>
+          <a:p>
+            <a:r>
+              <a:rPr lang="en-US" sz="4000" dirty="0" err="1"/>
+              <a:t>Hvorfor</a:t>
+            </a:r>
+            <a:r>
+              <a:rPr lang="en-US" sz="4000" dirty="0"/>
+              <a:t> teste?</a:t>
+            </a:r>
+          </a:p>
+          <a:p>
+            <a:r>
+              <a:rPr lang="en-US" sz="4000" dirty="0" err="1"/>
+              <a:t>Hvilke</a:t>
+            </a:r>
+            <a:r>
+              <a:rPr lang="en-US" sz="4000" dirty="0"/>
+              <a:t> </a:t>
+            </a:r>
+            <a:r>
+              <a:rPr lang="en-US" sz="4000" dirty="0" err="1"/>
+              <a:t>typer</a:t>
+            </a:r>
+            <a:r>
+              <a:rPr lang="en-US" sz="4000" dirty="0"/>
+              <a:t> test?</a:t>
+            </a:r>
+          </a:p>
+          <a:p>
+            <a:r>
+              <a:rPr lang="en-US" sz="4000" dirty="0"/>
+              <a:t>Unit Test </a:t>
+            </a:r>
+            <a:r>
+              <a:rPr lang="en-US" sz="4000" dirty="0" err="1"/>
+              <a:t>klassen</a:t>
+            </a:r>
+            <a:endParaRPr lang="en-US" sz="4000" dirty="0"/>
+          </a:p>
+          <a:p>
+            <a:r>
+              <a:rPr lang="en-US" sz="4000" dirty="0" err="1"/>
+              <a:t>Testbaseret</a:t>
+            </a:r>
+            <a:r>
+              <a:rPr lang="en-US" sz="4000" dirty="0"/>
+              <a:t> </a:t>
+            </a:r>
+            <a:r>
+              <a:rPr lang="en-US" sz="4000" dirty="0" err="1"/>
+              <a:t>udvikling</a:t>
+            </a:r>
+            <a:endParaRPr lang="en-US" sz="3600" dirty="0"/>
+          </a:p>
+          <a:p>
+            <a:r>
+              <a:rPr lang="en-US" sz="4000" dirty="0" err="1"/>
+              <a:t>ManageOpgaveTest</a:t>
+            </a:r>
+            <a:endParaRPr lang="en-US" sz="4000" dirty="0"/>
           </a:p>
         </p:txBody>
       </p:sp>
@@ -4040,6 +4360,201 @@
     <p:extLst>
       <p:ext uri="{BB962C8B-B14F-4D97-AF65-F5344CB8AC3E}">
         <p14:creationId xmlns:p14="http://schemas.microsoft.com/office/powerpoint/2010/main" val="1709688639"/>
+      </p:ext>
+    </p:extLst>
+  </p:cSld>
+  <p:clrMapOvr>
+    <a:masterClrMapping/>
+  </p:clrMapOvr>
+</p:sld>
+</file>
+
+<file path=ppt/slides/slide9.xml><?xml version="1.0" encoding="utf-8"?>
+<p:sld xmlns:a="http://schemas.openxmlformats.org/drawingml/2006/main" xmlns:r="http://schemas.openxmlformats.org/officeDocument/2006/relationships" xmlns:p="http://schemas.openxmlformats.org/presentationml/2006/main">
+  <p:cSld>
+    <p:spTree>
+      <p:nvGrpSpPr>
+        <p:cNvPr id="1" name=""/>
+        <p:cNvGrpSpPr/>
+        <p:nvPr/>
+      </p:nvGrpSpPr>
+      <p:grpSpPr>
+        <a:xfrm>
+          <a:off x="0" y="0"/>
+          <a:ext cx="0" cy="0"/>
+          <a:chOff x="0" y="0"/>
+          <a:chExt cx="0" cy="0"/>
+        </a:xfrm>
+      </p:grpSpPr>
+      <p:sp>
+        <p:nvSpPr>
+          <p:cNvPr id="2" name="Title 1">
+            <a:extLst>
+              <a:ext uri="{FF2B5EF4-FFF2-40B4-BE49-F238E27FC236}">
+                <a16:creationId xmlns:a16="http://schemas.microsoft.com/office/drawing/2014/main" id="{ED299F10-EA46-42E7-B23A-CC80B32DD352}"/>
+              </a:ext>
+            </a:extLst>
+          </p:cNvPr>
+          <p:cNvSpPr>
+            <a:spLocks noGrp="1"/>
+          </p:cNvSpPr>
+          <p:nvPr>
+            <p:ph type="title"/>
+          </p:nvPr>
+        </p:nvSpPr>
+        <p:spPr/>
+        <p:txBody>
+          <a:bodyPr/>
+          <a:lstStyle/>
+          <a:p>
+            <a:r>
+              <a:rPr lang="en-US" dirty="0"/>
+              <a:t>Tanker </a:t>
+            </a:r>
+            <a:r>
+              <a:rPr lang="en-US" dirty="0" err="1"/>
+              <a:t>til</a:t>
+            </a:r>
+            <a:r>
+              <a:rPr lang="en-US" dirty="0"/>
+              <a:t> </a:t>
+            </a:r>
+            <a:r>
+              <a:rPr lang="en-US" dirty="0" err="1"/>
+              <a:t>fremtiden</a:t>
+            </a:r>
+            <a:endParaRPr lang="en-US" dirty="0"/>
+          </a:p>
+        </p:txBody>
+      </p:sp>
+      <p:sp>
+        <p:nvSpPr>
+          <p:cNvPr id="3" name="Content Placeholder 2">
+            <a:extLst>
+              <a:ext uri="{FF2B5EF4-FFF2-40B4-BE49-F238E27FC236}">
+                <a16:creationId xmlns:a16="http://schemas.microsoft.com/office/drawing/2014/main" id="{659846B2-20E6-43AA-A4BD-D73A8DA54F03}"/>
+              </a:ext>
+            </a:extLst>
+          </p:cNvPr>
+          <p:cNvSpPr>
+            <a:spLocks noGrp="1"/>
+          </p:cNvSpPr>
+          <p:nvPr>
+            <p:ph idx="1"/>
+          </p:nvPr>
+        </p:nvSpPr>
+        <p:spPr/>
+        <p:txBody>
+          <a:bodyPr>
+            <a:normAutofit/>
+          </a:bodyPr>
+          <a:lstStyle/>
+          <a:p>
+            <a:r>
+              <a:rPr lang="en-US" sz="3600" dirty="0"/>
+              <a:t>Exceptions for mere Error Prevention</a:t>
+            </a:r>
+          </a:p>
+          <a:p>
+            <a:r>
+              <a:rPr lang="en-US" sz="3600" dirty="0" err="1"/>
+              <a:t>Forbedring</a:t>
+            </a:r>
+            <a:r>
+              <a:rPr lang="en-US" sz="3600" dirty="0"/>
+              <a:t> </a:t>
+            </a:r>
+            <a:r>
+              <a:rPr lang="en-US" sz="3600" dirty="0" err="1"/>
+              <a:t>af</a:t>
+            </a:r>
+            <a:r>
+              <a:rPr lang="en-US" sz="3600" dirty="0"/>
+              <a:t> GUI</a:t>
+            </a:r>
+          </a:p>
+          <a:p>
+            <a:pPr lvl="1"/>
+            <a:r>
+              <a:rPr lang="en-US" sz="3600" dirty="0"/>
+              <a:t>Overhold </a:t>
+            </a:r>
+            <a:r>
+              <a:rPr lang="en-US" sz="3600" dirty="0" err="1"/>
+              <a:t>flere</a:t>
+            </a:r>
+            <a:r>
+              <a:rPr lang="en-US" sz="3600" dirty="0"/>
+              <a:t> </a:t>
+            </a:r>
+            <a:r>
+              <a:rPr lang="en-US" sz="3600" dirty="0" err="1"/>
+              <a:t>heuristikker</a:t>
+            </a:r>
+            <a:endParaRPr lang="en-US" sz="3600" dirty="0"/>
+          </a:p>
+          <a:p>
+            <a:r>
+              <a:rPr lang="en-US" sz="3600" dirty="0" err="1"/>
+              <a:t>Tydeligere</a:t>
+            </a:r>
+            <a:r>
+              <a:rPr lang="en-US" sz="3600" dirty="0"/>
+              <a:t> </a:t>
+            </a:r>
+            <a:r>
+              <a:rPr lang="en-US" sz="3600" dirty="0" err="1"/>
+              <a:t>afgrænsning</a:t>
+            </a:r>
+            <a:r>
+              <a:rPr lang="en-US" sz="3600" dirty="0"/>
+              <a:t> </a:t>
+            </a:r>
+            <a:r>
+              <a:rPr lang="en-US" sz="3600" dirty="0" err="1"/>
+              <a:t>af</a:t>
+            </a:r>
+            <a:r>
+              <a:rPr lang="en-US" sz="3600" dirty="0"/>
+              <a:t> </a:t>
+            </a:r>
+            <a:r>
+              <a:rPr lang="en-US" sz="3600" dirty="0" err="1"/>
+              <a:t>iterationer</a:t>
+            </a:r>
+            <a:endParaRPr lang="en-US" sz="3600" dirty="0"/>
+          </a:p>
+          <a:p>
+            <a:r>
+              <a:rPr lang="en-US" sz="3600" dirty="0" err="1"/>
+              <a:t>Refaktorering</a:t>
+            </a:r>
+            <a:endParaRPr lang="en-US" sz="3600" dirty="0"/>
+          </a:p>
+          <a:p>
+            <a:r>
+              <a:rPr lang="en-US" sz="3600" dirty="0" err="1"/>
+              <a:t>Flere</a:t>
+            </a:r>
+            <a:r>
+              <a:rPr lang="en-US" sz="3600" dirty="0"/>
+              <a:t> </a:t>
+            </a:r>
+            <a:r>
+              <a:rPr lang="en-US" sz="3600" dirty="0" err="1"/>
+              <a:t>bruger</a:t>
+            </a:r>
+            <a:r>
+              <a:rPr lang="en-US" sz="3600" dirty="0"/>
+              <a:t> tests</a:t>
+            </a:r>
+          </a:p>
+        </p:txBody>
+      </p:sp>
+    </p:spTree>
+    <p:extLst>
+      <p:ext uri="{BB962C8B-B14F-4D97-AF65-F5344CB8AC3E}">
+        <p14:creationId xmlns:p14="http://schemas.microsoft.com/office/powerpoint/2010/main" val="2556456492"/>
       </p:ext>
     </p:extLst>
   </p:cSld>

</xml_diff>